<commit_message>
Updates unit testing slides
</commit_message>
<xml_diff>
--- a/automation-testing/unit-testing.pptx
+++ b/automation-testing/unit-testing.pptx
@@ -41,8 +41,8 @@
     <p:sldId id="292" r:id="rId32"/>
     <p:sldId id="262" r:id="rId33"/>
     <p:sldId id="360" r:id="rId34"/>
-    <p:sldId id="380" r:id="rId35"/>
-    <p:sldId id="362" r:id="rId36"/>
+    <p:sldId id="362" r:id="rId35"/>
+    <p:sldId id="396" r:id="rId36"/>
     <p:sldId id="294" r:id="rId37"/>
     <p:sldId id="299" r:id="rId38"/>
     <p:sldId id="363" r:id="rId39"/>
@@ -11183,7 +11183,7 @@
           <a:p>
             <a:fld id="{22863330-3B5E-4DDC-B367-420FBD9EBCE7}" type="datetimeFigureOut">
               <a:rPr lang="en-US" smtClean="0"/>
-              <a:t>1/31/2022</a:t>
+              <a:t>2/7/2022</a:t>
             </a:fld>
             <a:endParaRPr lang="en-US"/>
           </a:p>
@@ -12503,7 +12503,7 @@
           <a:p>
             <a:fld id="{0FD284B5-0961-4622-B730-FA27FC41D0FE}" type="datetimeFigureOut">
               <a:rPr lang="ru-RU" smtClean="0"/>
-              <a:t>31.01.2022</a:t>
+              <a:t>07.02.2022</a:t>
             </a:fld>
             <a:endParaRPr lang="ru-RU"/>
           </a:p>
@@ -12671,7 +12671,7 @@
           <a:p>
             <a:fld id="{0FD284B5-0961-4622-B730-FA27FC41D0FE}" type="datetimeFigureOut">
               <a:rPr lang="ru-RU" smtClean="0"/>
-              <a:t>31.01.2022</a:t>
+              <a:t>07.02.2022</a:t>
             </a:fld>
             <a:endParaRPr lang="ru-RU"/>
           </a:p>
@@ -12849,7 +12849,7 @@
           <a:p>
             <a:fld id="{0FD284B5-0961-4622-B730-FA27FC41D0FE}" type="datetimeFigureOut">
               <a:rPr lang="ru-RU" smtClean="0"/>
-              <a:t>31.01.2022</a:t>
+              <a:t>07.02.2022</a:t>
             </a:fld>
             <a:endParaRPr lang="ru-RU"/>
           </a:p>
@@ -13017,7 +13017,7 @@
           <a:p>
             <a:fld id="{0FD284B5-0961-4622-B730-FA27FC41D0FE}" type="datetimeFigureOut">
               <a:rPr lang="ru-RU" smtClean="0"/>
-              <a:t>31.01.2022</a:t>
+              <a:t>07.02.2022</a:t>
             </a:fld>
             <a:endParaRPr lang="ru-RU"/>
           </a:p>
@@ -13262,7 +13262,7 @@
           <a:p>
             <a:fld id="{0FD284B5-0961-4622-B730-FA27FC41D0FE}" type="datetimeFigureOut">
               <a:rPr lang="ru-RU" smtClean="0"/>
-              <a:t>31.01.2022</a:t>
+              <a:t>07.02.2022</a:t>
             </a:fld>
             <a:endParaRPr lang="ru-RU"/>
           </a:p>
@@ -13491,7 +13491,7 @@
           <a:p>
             <a:fld id="{0FD284B5-0961-4622-B730-FA27FC41D0FE}" type="datetimeFigureOut">
               <a:rPr lang="ru-RU" smtClean="0"/>
-              <a:t>31.01.2022</a:t>
+              <a:t>07.02.2022</a:t>
             </a:fld>
             <a:endParaRPr lang="ru-RU"/>
           </a:p>
@@ -13855,7 +13855,7 @@
           <a:p>
             <a:fld id="{0FD284B5-0961-4622-B730-FA27FC41D0FE}" type="datetimeFigureOut">
               <a:rPr lang="ru-RU" smtClean="0"/>
-              <a:t>31.01.2022</a:t>
+              <a:t>07.02.2022</a:t>
             </a:fld>
             <a:endParaRPr lang="ru-RU"/>
           </a:p>
@@ -13972,7 +13972,7 @@
           <a:p>
             <a:fld id="{0FD284B5-0961-4622-B730-FA27FC41D0FE}" type="datetimeFigureOut">
               <a:rPr lang="ru-RU" smtClean="0"/>
-              <a:t>31.01.2022</a:t>
+              <a:t>07.02.2022</a:t>
             </a:fld>
             <a:endParaRPr lang="ru-RU"/>
           </a:p>
@@ -14067,7 +14067,7 @@
           <a:p>
             <a:fld id="{0FD284B5-0961-4622-B730-FA27FC41D0FE}" type="datetimeFigureOut">
               <a:rPr lang="ru-RU" smtClean="0"/>
-              <a:t>31.01.2022</a:t>
+              <a:t>07.02.2022</a:t>
             </a:fld>
             <a:endParaRPr lang="ru-RU"/>
           </a:p>
@@ -14342,7 +14342,7 @@
           <a:p>
             <a:fld id="{0FD284B5-0961-4622-B730-FA27FC41D0FE}" type="datetimeFigureOut">
               <a:rPr lang="ru-RU" smtClean="0"/>
-              <a:t>31.01.2022</a:t>
+              <a:t>07.02.2022</a:t>
             </a:fld>
             <a:endParaRPr lang="ru-RU"/>
           </a:p>
@@ -14594,7 +14594,7 @@
           <a:p>
             <a:fld id="{0FD284B5-0961-4622-B730-FA27FC41D0FE}" type="datetimeFigureOut">
               <a:rPr lang="ru-RU" smtClean="0"/>
-              <a:t>31.01.2022</a:t>
+              <a:t>07.02.2022</a:t>
             </a:fld>
             <a:endParaRPr lang="ru-RU"/>
           </a:p>
@@ -14805,7 +14805,7 @@
           <a:p>
             <a:fld id="{0FD284B5-0961-4622-B730-FA27FC41D0FE}" type="datetimeFigureOut">
               <a:rPr lang="ru-RU" smtClean="0"/>
-              <a:t>31.01.2022</a:t>
+              <a:t>07.02.2022</a:t>
             </a:fld>
             <a:endParaRPr lang="ru-RU"/>
           </a:p>
@@ -18736,7 +18736,7 @@
             </a:pPr>
             <a:r>
               <a:rPr lang="en-US" sz="2400" dirty="0"/>
-              <a:t>No coverage metric considers code paths in external libraries.</a:t>
+              <a:t>No metric considers code paths in external libraries.</a:t>
             </a:r>
           </a:p>
           <a:p>
@@ -18835,7 +18835,7 @@
           <a:p>
             <a:r>
               <a:rPr lang="en-US" i="1" dirty="0"/>
-              <a:t>Great test attributes</a:t>
+              <a:t>Test attributes</a:t>
             </a:r>
           </a:p>
           <a:p>
@@ -18912,7 +18912,7 @@
           <a:p>
             <a:r>
               <a:rPr lang="en-US" dirty="0"/>
-              <a:t>Great test attributes</a:t>
+              <a:t>Test attributes</a:t>
             </a:r>
             <a:endParaRPr lang="ru-RU" dirty="0"/>
           </a:p>
@@ -18937,7 +18937,7 @@
           <a:p>
             <a:r>
               <a:rPr lang="en-US" sz="2400" dirty="0"/>
-              <a:t>Protection from regression (unnoticed bugs – false negative)</a:t>
+              <a:t>Protection against bugs (unnoticed bugs – false negative)</a:t>
             </a:r>
           </a:p>
           <a:p>
@@ -19094,7 +19094,7 @@
           <a:p>
             <a:r>
               <a:rPr lang="en-US" sz="2400" dirty="0"/>
-              <a:t>Test fragility: it should not matter how the SUT generates the result, if result is correct</a:t>
+              <a:t>Test fragility: it should not matter how the SUT generates the result, if this result is correct</a:t>
             </a:r>
           </a:p>
           <a:p>
@@ -20108,7 +20108,7 @@
           <a:p>
             <a:r>
               <a:rPr lang="en-US" dirty="0"/>
-              <a:t>Public API &amp; Observable behavior</a:t>
+              <a:t>Public/private API &amp; Observable behavior</a:t>
             </a:r>
           </a:p>
         </p:txBody>
@@ -20794,20 +20794,23 @@
               <a:rPr lang="en-US" sz="2400" dirty="0">
                 <a:hlinkClick r:id="rId2"/>
               </a:rPr>
+              <a:t>https://blog.devgenius.io/detroit-and-london-schools-of-test-driven-development-3d2f8dca71e5</a:t>
+            </a:r>
+            <a:r>
+              <a:rPr lang="en-US" sz="2400" dirty="0"/>
+              <a:t> </a:t>
+            </a:r>
+          </a:p>
+          <a:p>
+            <a:r>
+              <a:rPr lang="en-US" sz="2400" dirty="0">
+                <a:hlinkClick r:id="rId3"/>
+              </a:rPr>
               <a:t>https://devlead.io/DevTips/LondonVsChicago</a:t>
             </a:r>
             <a:endParaRPr lang="ru-RU" sz="2400" dirty="0">
-              <a:hlinkClick r:id="rId2"/>
+              <a:hlinkClick r:id="rId3"/>
             </a:endParaRPr>
-          </a:p>
-          <a:p>
-            <a:r>
-              <a:rPr lang="en-US" sz="2400" dirty="0">
-                <a:hlinkClick r:id="rId2"/>
-              </a:rPr>
-              <a:t>https://blog.ncrunch.net/post/london-tdd-vs-detroit-tdd.aspx</a:t>
-            </a:r>
-            <a:endParaRPr lang="en-US" sz="2400" dirty="0"/>
           </a:p>
         </p:txBody>
       </p:sp>
@@ -20826,7 +20829,7 @@
           <p:nvPr/>
         </p:nvPicPr>
         <p:blipFill>
-          <a:blip r:embed="rId3"/>
+          <a:blip r:embed="rId4"/>
           <a:stretch>
             <a:fillRect/>
           </a:stretch>
@@ -20925,7 +20928,7 @@
           <p:nvPr>
             <p:extLst>
               <p:ext uri="{D42A27DB-BD31-4B8C-83A1-F6EECF244321}">
-                <p14:modId xmlns:p14="http://schemas.microsoft.com/office/powerpoint/2010/main" val="2872979664"/>
+                <p14:modId xmlns:p14="http://schemas.microsoft.com/office/powerpoint/2010/main" val="4136572497"/>
               </p:ext>
             </p:extLst>
           </p:nvPr>
@@ -20941,21 +20944,21 @@
                 <a:tableStyleId>{5C22544A-7EE6-4342-B048-85BDC9FD1C3A}</a:tableStyleId>
               </a:tblPr>
               <a:tblGrid>
-                <a:gridCol w="2102069">
+                <a:gridCol w="1649512">
                   <a:extLst>
                     <a:ext uri="{9D8B030D-6E8A-4147-A177-3AD203B41FA5}">
                       <a16:colId xmlns:a16="http://schemas.microsoft.com/office/drawing/2014/main" val="20000"/>
                     </a:ext>
                   </a:extLst>
                 </a:gridCol>
-                <a:gridCol w="3394842">
+                <a:gridCol w="3279913">
                   <a:extLst>
                     <a:ext uri="{9D8B030D-6E8A-4147-A177-3AD203B41FA5}">
                       <a16:colId xmlns:a16="http://schemas.microsoft.com/office/drawing/2014/main" val="20001"/>
                     </a:ext>
                   </a:extLst>
                 </a:gridCol>
-                <a:gridCol w="2354319">
+                <a:gridCol w="2921805">
                   <a:extLst>
                     <a:ext uri="{9D8B030D-6E8A-4147-A177-3AD203B41FA5}">
                       <a16:colId xmlns:a16="http://schemas.microsoft.com/office/drawing/2014/main" val="20002"/>
@@ -20971,7 +20974,7 @@
                     <a:p>
                       <a:r>
                         <a:rPr lang="en-US" sz="2000" dirty="0"/>
-                        <a:t>Communications:</a:t>
+                        <a:t>Type</a:t>
                       </a:r>
                       <a:endParaRPr lang="ru-RU" sz="2000" dirty="0"/>
                     </a:p>
@@ -20985,7 +20988,7 @@
                     <a:p>
                       <a:r>
                         <a:rPr lang="en-US" sz="2000" dirty="0"/>
-                        <a:t>Intra-system</a:t>
+                        <a:t>Between</a:t>
                       </a:r>
                       <a:endParaRPr lang="ru-RU" sz="2000" dirty="0"/>
                     </a:p>
@@ -20999,7 +21002,7 @@
                     <a:p>
                       <a:r>
                         <a:rPr lang="en-US" sz="2000" dirty="0"/>
-                        <a:t>Inter-system</a:t>
+                        <a:t>Treated as</a:t>
                       </a:r>
                       <a:endParaRPr lang="ru-RU" sz="2000" dirty="0"/>
                     </a:p>
@@ -21019,10 +21022,10 @@
                     <a:lstStyle/>
                     <a:p>
                       <a:r>
-                        <a:rPr lang="en-US" sz="2000" i="1" dirty="0"/>
-                        <a:t>Between</a:t>
+                        <a:rPr lang="en-US" sz="2000" b="1" dirty="0"/>
+                        <a:t>Intra-system</a:t>
                       </a:r>
-                      <a:endParaRPr lang="ru-RU" sz="1600" i="1" dirty="0"/>
+                      <a:endParaRPr lang="ru-RU" sz="2000" b="1" dirty="0"/>
                     </a:p>
                   </a:txBody>
                   <a:tcPr/>
@@ -21067,28 +21070,11 @@
                     <a:bodyPr/>
                     <a:lstStyle/>
                     <a:p>
-                      <a:pPr marL="0" marR="0" indent="0" algn="l" defTabSz="914400" rtl="0" eaLnBrk="1" fontAlgn="auto" latinLnBrk="0" hangingPunct="1">
-                        <a:lnSpc>
-                          <a:spcPct val="100000"/>
-                        </a:lnSpc>
-                        <a:spcBef>
-                          <a:spcPts val="0"/>
-                        </a:spcBef>
-                        <a:spcAft>
-                          <a:spcPts val="0"/>
-                        </a:spcAft>
-                        <a:buClrTx/>
-                        <a:buSzTx/>
-                        <a:buFontTx/>
-                        <a:buNone/>
-                        <a:tabLst/>
-                        <a:defRPr/>
-                      </a:pPr>
                       <a:r>
                         <a:rPr lang="en-US" sz="2000" dirty="0"/>
-                        <a:t>Applications</a:t>
+                        <a:t>Implementation details</a:t>
                       </a:r>
-                      <a:endParaRPr lang="ru-RU" sz="1600" dirty="0"/>
+                      <a:endParaRPr lang="ru-RU" sz="2000" dirty="0"/>
                     </a:p>
                   </a:txBody>
                   <a:tcPr/>
@@ -21106,10 +21092,10 @@
                     <a:lstStyle/>
                     <a:p>
                       <a:r>
-                        <a:rPr lang="en-US" sz="2000" i="1" dirty="0"/>
-                        <a:t>Treated as</a:t>
+                        <a:rPr lang="en-US" sz="2000" b="1" dirty="0"/>
+                        <a:t>Inter-system</a:t>
                       </a:r>
-                      <a:endParaRPr lang="ru-RU" sz="2000" i="1" dirty="0"/>
+                      <a:endParaRPr lang="ru-RU" sz="2000" b="1" dirty="0"/>
                     </a:p>
                   </a:txBody>
                   <a:tcPr/>
@@ -21121,7 +21107,7 @@
                     <a:p>
                       <a:r>
                         <a:rPr lang="en-US" sz="2000" dirty="0"/>
-                        <a:t>Implementation details</a:t>
+                        <a:t>Applications</a:t>
                       </a:r>
                       <a:endParaRPr lang="ru-RU" sz="2000" dirty="0"/>
                     </a:p>
@@ -22053,7 +22039,7 @@
         <p:spPr>
           <a:xfrm>
             <a:off x="5179541" y="2506764"/>
-            <a:ext cx="5558367" cy="1325563"/>
+            <a:ext cx="6588389" cy="1325563"/>
           </a:xfrm>
         </p:spPr>
         <p:txBody>
@@ -22064,14 +22050,14 @@
           <a:p>
             <a:r>
               <a:rPr lang="en-US" dirty="0"/>
-              <a:t>Number of bugs found</a:t>
+              <a:t>Number of bugs test can found</a:t>
             </a:r>
             <a:br>
               <a:rPr lang="en-US" dirty="0"/>
             </a:br>
             <a:r>
               <a:rPr lang="en-US" dirty="0"/>
-              <a:t>------------------------------</a:t>
+              <a:t>-----------------------------------------</a:t>
             </a:r>
             <a:br>
               <a:rPr lang="en-US" dirty="0"/>
@@ -22637,7 +22623,7 @@
             </a:r>
             <a:r>
               <a:rPr lang="en-US" sz="2400" dirty="0"/>
-              <a:t>&lt;Protection From Regression&gt; *</a:t>
+              <a:t>&lt;Protection against bugs&gt; *</a:t>
             </a:r>
           </a:p>
           <a:p>
@@ -22646,7 +22632,7 @@
             </a:pPr>
             <a:r>
               <a:rPr lang="en-US" sz="2400" dirty="0"/>
-              <a:t>&lt;Resistance To Refactoring&gt; *</a:t>
+              <a:t>&lt;Resistance to refactoring&gt; *</a:t>
             </a:r>
           </a:p>
           <a:p>
@@ -22655,7 +22641,7 @@
             </a:pPr>
             <a:r>
               <a:rPr lang="en-US" sz="2400" dirty="0"/>
-              <a:t>&lt;Fast Feedback&gt; * &lt;Maintenance&gt;</a:t>
+              <a:t>&lt;Fast feedback&gt; * &lt;Maintenance&gt;</a:t>
             </a:r>
           </a:p>
         </p:txBody>
@@ -22777,7 +22763,7 @@
             </a:pPr>
             <a:r>
               <a:rPr lang="en-US" sz="2400" dirty="0"/>
-              <a:t>Protection from Regression (</a:t>
+              <a:t>Protection against bugs (</a:t>
             </a:r>
             <a:r>
               <a:rPr lang="en-US" sz="2400" i="1" dirty="0"/>
@@ -22803,7 +22789,7 @@
             </a:pPr>
             <a:r>
               <a:rPr lang="en-US" sz="2400" dirty="0"/>
-              <a:t>Resistance to Refactoring (</a:t>
+              <a:t>Resistance to refactoring (</a:t>
             </a:r>
             <a:r>
               <a:rPr lang="en-US" sz="2400" i="1" dirty="0"/>
@@ -22974,7 +22960,7 @@
         </p:nvSpPr>
         <p:spPr>
           <a:xfrm>
-            <a:off x="1026628" y="4680567"/>
+            <a:off x="1130870" y="4598553"/>
             <a:ext cx="3485057" cy="400110"/>
           </a:xfrm>
           <a:prstGeom prst="rect">
@@ -23313,8 +23299,8 @@
         </p:nvSpPr>
         <p:spPr>
           <a:xfrm>
-            <a:off x="853246" y="4218902"/>
-            <a:ext cx="3924601" cy="461665"/>
+            <a:off x="1445535" y="4081778"/>
+            <a:ext cx="3099118" cy="461665"/>
           </a:xfrm>
           <a:prstGeom prst="rect">
             <a:avLst/>
@@ -23329,7 +23315,7 @@
           <a:p>
             <a:r>
               <a:rPr lang="en-US" sz="2400" dirty="0"/>
-              <a:t>Protection against regressions</a:t>
+              <a:t>Protection against bugs</a:t>
             </a:r>
             <a:endParaRPr lang="ru-RU" sz="2400" dirty="0"/>
           </a:p>
@@ -23980,8 +23966,8 @@
         </p:nvSpPr>
         <p:spPr>
           <a:xfrm>
-            <a:off x="2514479" y="4195525"/>
-            <a:ext cx="2552686" cy="830997"/>
+            <a:off x="2927221" y="4195525"/>
+            <a:ext cx="1727203" cy="830997"/>
           </a:xfrm>
           <a:prstGeom prst="rect">
             <a:avLst/>
@@ -24004,7 +23990,7 @@
             <a:pPr algn="ctr"/>
             <a:r>
               <a:rPr lang="en-US" sz="2400" dirty="0"/>
-              <a:t>against regressions</a:t>
+              <a:t>against bugs</a:t>
             </a:r>
             <a:endParaRPr lang="ru-RU" sz="2400" dirty="0"/>
           </a:p>
@@ -25143,7 +25129,7 @@
         <p:spPr>
           <a:xfrm>
             <a:off x="630936" y="2807208"/>
-            <a:ext cx="3429000" cy="3410712"/>
+            <a:ext cx="3941064" cy="3410712"/>
           </a:xfrm>
         </p:spPr>
         <p:txBody>
@@ -25758,8 +25744,8 @@
         </p:nvSpPr>
         <p:spPr>
           <a:xfrm>
-            <a:off x="1021335" y="4095793"/>
-            <a:ext cx="2552686" cy="830997"/>
+            <a:off x="1434076" y="4095793"/>
+            <a:ext cx="1727204" cy="830997"/>
           </a:xfrm>
           <a:prstGeom prst="rect">
             <a:avLst/>
@@ -25782,7 +25768,7 @@
             <a:pPr algn="ctr"/>
             <a:r>
               <a:rPr lang="en-US" sz="2400" dirty="0"/>
-              <a:t>against regressions</a:t>
+              <a:t>against bugs</a:t>
             </a:r>
             <a:endParaRPr lang="ru-RU" sz="2400" dirty="0"/>
           </a:p>
@@ -25914,7 +25900,7 @@
         </p:nvSpPr>
         <p:spPr>
           <a:xfrm>
-            <a:off x="7078823" y="5488485"/>
+            <a:off x="6912318" y="5491404"/>
             <a:ext cx="1378519" cy="461665"/>
           </a:xfrm>
           <a:prstGeom prst="rect">
@@ -26044,7 +26030,7 @@
         </p:nvCxnSpPr>
         <p:spPr>
           <a:xfrm>
-            <a:off x="6885758" y="5025611"/>
+            <a:off x="6719253" y="5028530"/>
             <a:ext cx="882325" cy="462874"/>
           </a:xfrm>
           <a:prstGeom prst="line">
@@ -26182,7 +26168,7 @@
             </a:r>
             <a:r>
               <a:rPr lang="en-US" sz="2400" b="1" dirty="0"/>
-              <a:t>100% assurance from regressions</a:t>
+              <a:t>100% assurance from bugs</a:t>
             </a:r>
             <a:r>
               <a:rPr lang="en-US" sz="2400" dirty="0"/>
@@ -27100,7 +27086,7 @@
           <a:p>
             <a:r>
               <a:rPr lang="en-US" i="1" dirty="0"/>
-              <a:t>Isolation approaches (Classical vs London school)</a:t>
+              <a:t>Isolation approaches</a:t>
             </a:r>
           </a:p>
           <a:p>
@@ -27112,13 +27098,13 @@
           <a:p>
             <a:r>
               <a:rPr lang="en-US" i="1" dirty="0"/>
-              <a:t>Stubs / mocks</a:t>
+              <a:t>Stubs/mocks</a:t>
             </a:r>
           </a:p>
           <a:p>
             <a:r>
               <a:rPr lang="en-US" i="1" dirty="0"/>
-              <a:t>Command / query separation</a:t>
+              <a:t>Command/query separation</a:t>
             </a:r>
             <a:endParaRPr lang="ru-RU" i="1" dirty="0"/>
           </a:p>
@@ -27212,7 +27198,7 @@
           <a:p>
             <a:r>
               <a:rPr lang="en-US" sz="2400" dirty="0"/>
-              <a:t>Private: mutable/immutable</a:t>
+              <a:t>Private: mutable/immutable (value object)</a:t>
             </a:r>
           </a:p>
           <a:p>
@@ -27302,19 +27288,7 @@
           <a:p>
             <a:r>
               <a:rPr lang="en-US" sz="2400" dirty="0"/>
-              <a:t>Classical (or Chicago, or Detroit) – substitutes </a:t>
-            </a:r>
-            <a:r>
-              <a:rPr lang="en-US" sz="2400" dirty="0">
-                <a:solidFill>
-                  <a:srgbClr val="00B050"/>
-                </a:solidFill>
-              </a:rPr>
-              <a:t>only</a:t>
-            </a:r>
-            <a:r>
-              <a:rPr lang="en-US" sz="2400" dirty="0"/>
-              <a:t> </a:t>
+              <a:t>Substitution of </a:t>
             </a:r>
             <a:r>
               <a:rPr lang="en-US" sz="2400" dirty="0">
@@ -27326,21 +27300,17 @@
             </a:r>
             <a:r>
               <a:rPr lang="en-US" sz="2400" dirty="0"/>
-              <a:t> dependencies. </a:t>
+              <a:t> dependencies. Isolates unit test from another unit test (bonus: run tests in parallel) – </a:t>
             </a:r>
             <a:r>
               <a:rPr lang="en-US" sz="2400" b="1" dirty="0"/>
-              <a:t>Isolates unit test from another unit test</a:t>
-            </a:r>
+              <a:t>Detroit school</a:t>
+            </a:r>
+          </a:p>
+          <a:p>
             <a:r>
               <a:rPr lang="en-US" sz="2400" dirty="0"/>
-              <a:t>. Bonus: run tests in parallel</a:t>
-            </a:r>
-          </a:p>
-          <a:p>
-            <a:r>
-              <a:rPr lang="en-US" sz="2400" dirty="0"/>
-              <a:t>London – classical approach + </a:t>
+              <a:t>Substitution of </a:t>
             </a:r>
             <a:r>
               <a:rPr lang="en-US" sz="2400" dirty="0">
@@ -27348,21 +27318,29 @@
                   <a:srgbClr val="00B050"/>
                 </a:solidFill>
               </a:rPr>
-              <a:t>mutable</a:t>
+              <a:t>shared </a:t>
             </a:r>
             <a:r>
               <a:rPr lang="en-US" sz="2400" dirty="0"/>
-              <a:t> dependencies are substituted. </a:t>
+              <a:t>and</a:t>
+            </a:r>
+            <a:r>
+              <a:rPr lang="en-US" sz="2400" dirty="0">
+                <a:solidFill>
+                  <a:srgbClr val="00B050"/>
+                </a:solidFill>
+              </a:rPr>
+              <a:t> mutable</a:t>
+            </a:r>
+            <a:r>
+              <a:rPr lang="en-US" sz="2400" dirty="0"/>
+              <a:t> dependencies. The highest unit isolation from another code – </a:t>
             </a:r>
             <a:r>
               <a:rPr lang="en-US" sz="2400" b="1" dirty="0"/>
-              <a:t>The highest unit isolation from another code</a:t>
-            </a:r>
-            <a:r>
-              <a:rPr lang="en-US" sz="2400" dirty="0"/>
-              <a:t>. Bonus: better granularity</a:t>
-            </a:r>
-            <a:endParaRPr lang="ru-RU" sz="2400" dirty="0"/>
+              <a:t>London school</a:t>
+            </a:r>
+            <a:endParaRPr lang="ru-RU" sz="2400" b="1" dirty="0"/>
           </a:p>
         </p:txBody>
       </p:sp>
@@ -27375,7 +27353,7 @@
           <p:nvPr>
             <p:extLst>
               <p:ext uri="{D42A27DB-BD31-4B8C-83A1-F6EECF244321}">
-                <p14:modId xmlns:p14="http://schemas.microsoft.com/office/powerpoint/2010/main" val="873950475"/>
+                <p14:modId xmlns:p14="http://schemas.microsoft.com/office/powerpoint/2010/main" val="1992984793"/>
               </p:ext>
             </p:extLst>
           </p:nvPr>
@@ -27558,7 +27536,7 @@
                     <a:p>
                       <a:r>
                         <a:rPr lang="en-US" sz="2400" b="1" dirty="0"/>
-                        <a:t>Classical</a:t>
+                        <a:t>Detroit</a:t>
                       </a:r>
                       <a:endParaRPr lang="ru-RU" sz="2400" b="1" dirty="0"/>
                     </a:p>
@@ -27647,350 +27625,15 @@
           <a:chExt cx="0" cy="0"/>
         </a:xfrm>
       </p:grpSpPr>
-      <p:grpSp>
-        <p:nvGrpSpPr>
-          <p:cNvPr id="37" name="Group 28">
+      <p:sp>
+        <p:nvSpPr>
+          <p:cNvPr id="8" name="Овал 1">
             <a:extLst>
               <a:ext uri="{FF2B5EF4-FFF2-40B4-BE49-F238E27FC236}">
-                <a16:creationId xmlns:a16="http://schemas.microsoft.com/office/drawing/2014/main" id="{DB88BD78-87E1-424D-B479-C37D8E41B12E}"/>
-              </a:ext>
-              <a:ext uri="{C183D7F6-B498-43B3-948B-1728B52AA6E4}">
-                <adec:decorative xmlns:adec="http://schemas.microsoft.com/office/drawing/2017/decorative" val="1"/>
+                <a16:creationId xmlns:a16="http://schemas.microsoft.com/office/drawing/2014/main" id="{2B5121B9-3606-4D38-9134-B87D55CA0291}"/>
               </a:ext>
             </a:extLst>
           </p:cNvPr>
-          <p:cNvGrpSpPr>
-            <a:grpSpLocks noGrp="1" noUngrp="1" noRot="1" noChangeAspect="1" noMove="1" noResize="1"/>
-          </p:cNvGrpSpPr>
-          <p:nvPr>
-            <p:extLst>
-              <p:ext uri="{386F3935-93C4-4BCD-93E2-E3B085C9AB24}">
-                <p16:designElem xmlns:p16="http://schemas.microsoft.com/office/powerpoint/2015/main" val="1"/>
-              </p:ext>
-            </p:extLst>
-          </p:nvPr>
-        </p:nvGrpSpPr>
-        <p:grpSpPr>
-          <a:xfrm flipH="1">
-            <a:off x="10964637" y="2358"/>
-            <a:ext cx="1876653" cy="1766008"/>
-            <a:chOff x="-648769" y="2358"/>
-            <a:chExt cx="1876653" cy="1766008"/>
-          </a:xfrm>
-        </p:grpSpPr>
-        <p:sp>
-          <p:nvSpPr>
-            <p:cNvPr id="30" name="Freeform: Shape 29">
-              <a:extLst>
-                <a:ext uri="{FF2B5EF4-FFF2-40B4-BE49-F238E27FC236}">
-                  <a16:creationId xmlns:a16="http://schemas.microsoft.com/office/drawing/2014/main" id="{C05EB894-9410-4B20-95E4-7A25101AB895}"/>
-                </a:ext>
-                <a:ext uri="{C183D7F6-B498-43B3-948B-1728B52AA6E4}">
-                  <adec:decorative xmlns:adec="http://schemas.microsoft.com/office/drawing/2017/decorative" val="1"/>
-                </a:ext>
-              </a:extLst>
-            </p:cNvPr>
-            <p:cNvSpPr/>
-            <p:nvPr>
-              <p:extLst>
-                <p:ext uri="{386F3935-93C4-4BCD-93E2-E3B085C9AB24}">
-                  <p16:designElem xmlns:p16="http://schemas.microsoft.com/office/powerpoint/2015/main" val="1"/>
-                </p:ext>
-              </p:extLst>
-            </p:nvPr>
-          </p:nvSpPr>
-          <p:spPr>
-            <a:xfrm rot="2700000">
-              <a:off x="-415188" y="-231223"/>
-              <a:ext cx="1409491" cy="1876653"/>
-            </a:xfrm>
-            <a:custGeom>
-              <a:avLst/>
-              <a:gdLst>
-                <a:gd name="connsiteX0" fmla="*/ 0 w 1409491"/>
-                <a:gd name="connsiteY0" fmla="*/ 643075 h 1876653"/>
-                <a:gd name="connsiteX1" fmla="*/ 643075 w 1409491"/>
-                <a:gd name="connsiteY1" fmla="*/ 0 h 1876653"/>
-                <a:gd name="connsiteX2" fmla="*/ 1409491 w 1409491"/>
-                <a:gd name="connsiteY2" fmla="*/ 0 h 1876653"/>
-                <a:gd name="connsiteX3" fmla="*/ 1409491 w 1409491"/>
-                <a:gd name="connsiteY3" fmla="*/ 1876653 h 1876653"/>
-                <a:gd name="connsiteX4" fmla="*/ 1233578 w 1409491"/>
-                <a:gd name="connsiteY4" fmla="*/ 1876653 h 1876653"/>
-              </a:gdLst>
-              <a:ahLst/>
-              <a:cxnLst>
-                <a:cxn ang="0">
-                  <a:pos x="connsiteX0" y="connsiteY0"/>
-                </a:cxn>
-                <a:cxn ang="0">
-                  <a:pos x="connsiteX1" y="connsiteY1"/>
-                </a:cxn>
-                <a:cxn ang="0">
-                  <a:pos x="connsiteX2" y="connsiteY2"/>
-                </a:cxn>
-                <a:cxn ang="0">
-                  <a:pos x="connsiteX3" y="connsiteY3"/>
-                </a:cxn>
-                <a:cxn ang="0">
-                  <a:pos x="connsiteX4" y="connsiteY4"/>
-                </a:cxn>
-              </a:cxnLst>
-              <a:rect l="l" t="t" r="r" b="b"/>
-              <a:pathLst>
-                <a:path w="1409491" h="1876653">
-                  <a:moveTo>
-                    <a:pt x="0" y="643075"/>
-                  </a:moveTo>
-                  <a:lnTo>
-                    <a:pt x="643075" y="0"/>
-                  </a:lnTo>
-                  <a:lnTo>
-                    <a:pt x="1409491" y="0"/>
-                  </a:lnTo>
-                  <a:lnTo>
-                    <a:pt x="1409491" y="1876653"/>
-                  </a:lnTo>
-                  <a:lnTo>
-                    <a:pt x="1233578" y="1876653"/>
-                  </a:lnTo>
-                  <a:close/>
-                </a:path>
-              </a:pathLst>
-            </a:custGeom>
-            <a:solidFill>
-              <a:schemeClr val="accent1">
-                <a:alpha val="30000"/>
-              </a:schemeClr>
-            </a:solidFill>
-            <a:ln>
-              <a:noFill/>
-            </a:ln>
-          </p:spPr>
-          <p:style>
-            <a:lnRef idx="2">
-              <a:schemeClr val="accent1">
-                <a:shade val="50000"/>
-              </a:schemeClr>
-            </a:lnRef>
-            <a:fillRef idx="1">
-              <a:schemeClr val="accent1"/>
-            </a:fillRef>
-            <a:effectRef idx="0">
-              <a:schemeClr val="accent1"/>
-            </a:effectRef>
-            <a:fontRef idx="minor">
-              <a:schemeClr val="lt1"/>
-            </a:fontRef>
-          </p:style>
-          <p:txBody>
-            <a:bodyPr rtlCol="0" anchor="ctr"/>
-            <a:lstStyle/>
-            <a:p>
-              <a:pPr algn="ctr"/>
-              <a:endParaRPr lang="en-US"/>
-            </a:p>
-          </p:txBody>
-        </p:sp>
-        <p:sp>
-          <p:nvSpPr>
-            <p:cNvPr id="38" name="Rectangle 30">
-              <a:extLst>
-                <a:ext uri="{FF2B5EF4-FFF2-40B4-BE49-F238E27FC236}">
-                  <a16:creationId xmlns:a16="http://schemas.microsoft.com/office/drawing/2014/main" id="{166E38B6-B050-4340-8E8F-3A971DADC031}"/>
-                </a:ext>
-                <a:ext uri="{C183D7F6-B498-43B3-948B-1728B52AA6E4}">
-                  <adec:decorative xmlns:adec="http://schemas.microsoft.com/office/drawing/2017/decorative" val="1"/>
-                </a:ext>
-              </a:extLst>
-            </p:cNvPr>
-            <p:cNvSpPr/>
-            <p:nvPr>
-              <p:extLst>
-                <p:ext uri="{386F3935-93C4-4BCD-93E2-E3B085C9AB24}">
-                  <p16:designElem xmlns:p16="http://schemas.microsoft.com/office/powerpoint/2015/main" val="1"/>
-                </p:ext>
-              </p:extLst>
-            </p:nvPr>
-          </p:nvSpPr>
-          <p:spPr>
-            <a:xfrm rot="2700000">
-              <a:off x="301285" y="1282788"/>
-              <a:ext cx="485578" cy="485578"/>
-            </a:xfrm>
-            <a:prstGeom prst="rect">
-              <a:avLst/>
-            </a:prstGeom>
-            <a:solidFill>
-              <a:schemeClr val="accent1">
-                <a:alpha val="30000"/>
-              </a:schemeClr>
-            </a:solidFill>
-            <a:ln>
-              <a:noFill/>
-            </a:ln>
-          </p:spPr>
-          <p:style>
-            <a:lnRef idx="2">
-              <a:schemeClr val="accent1">
-                <a:shade val="50000"/>
-              </a:schemeClr>
-            </a:lnRef>
-            <a:fillRef idx="1">
-              <a:schemeClr val="accent1"/>
-            </a:fillRef>
-            <a:effectRef idx="0">
-              <a:schemeClr val="accent1"/>
-            </a:effectRef>
-            <a:fontRef idx="minor">
-              <a:schemeClr val="lt1"/>
-            </a:fontRef>
-          </p:style>
-          <p:txBody>
-            <a:bodyPr rtlCol="0" anchor="ctr"/>
-            <a:lstStyle/>
-            <a:p>
-              <a:pPr algn="ctr"/>
-              <a:endParaRPr lang="en-US"/>
-            </a:p>
-          </p:txBody>
-        </p:sp>
-      </p:grpSp>
-      <p:sp>
-        <p:nvSpPr>
-          <p:cNvPr id="39" name="Rectangle 32">
-            <a:extLst>
-              <a:ext uri="{FF2B5EF4-FFF2-40B4-BE49-F238E27FC236}">
-                <a16:creationId xmlns:a16="http://schemas.microsoft.com/office/drawing/2014/main" id="{2E80C965-DB6D-4F81-9E9E-B027384D0BD6}"/>
-              </a:ext>
-              <a:ext uri="{C183D7F6-B498-43B3-948B-1728B52AA6E4}">
-                <adec:decorative xmlns:adec="http://schemas.microsoft.com/office/drawing/2017/decorative" val="1"/>
-              </a:ext>
-            </a:extLst>
-          </p:cNvPr>
-          <p:cNvSpPr>
-            <a:spLocks noGrp="1" noRot="1" noChangeAspect="1" noMove="1" noResize="1" noEditPoints="1" noAdjustHandles="1" noChangeArrowheads="1" noChangeShapeType="1" noTextEdit="1"/>
-          </p:cNvSpPr>
-          <p:nvPr>
-            <p:extLst>
-              <p:ext uri="{386F3935-93C4-4BCD-93E2-E3B085C9AB24}">
-                <p16:designElem xmlns:p16="http://schemas.microsoft.com/office/powerpoint/2015/main" val="1"/>
-              </p:ext>
-            </p:extLst>
-          </p:nvPr>
-        </p:nvSpPr>
-        <p:spPr>
-          <a:xfrm rot="2700000">
-            <a:off x="2737196" y="6033666"/>
-            <a:ext cx="645368" cy="645368"/>
-          </a:xfrm>
-          <a:prstGeom prst="rect">
-            <a:avLst/>
-          </a:prstGeom>
-          <a:solidFill>
-            <a:schemeClr val="accent4">
-              <a:alpha val="30000"/>
-            </a:schemeClr>
-          </a:solidFill>
-          <a:ln>
-            <a:noFill/>
-          </a:ln>
-        </p:spPr>
-        <p:style>
-          <a:lnRef idx="2">
-            <a:schemeClr val="accent1">
-              <a:shade val="50000"/>
-            </a:schemeClr>
-          </a:lnRef>
-          <a:fillRef idx="1">
-            <a:schemeClr val="accent1"/>
-          </a:fillRef>
-          <a:effectRef idx="0">
-            <a:schemeClr val="accent1"/>
-          </a:effectRef>
-          <a:fontRef idx="minor">
-            <a:schemeClr val="lt1"/>
-          </a:fontRef>
-        </p:style>
-        <p:txBody>
-          <a:bodyPr rtlCol="0" anchor="ctr"/>
-          <a:lstStyle/>
-          <a:p>
-            <a:pPr algn="ctr"/>
-            <a:endParaRPr lang="en-US"/>
-          </a:p>
-        </p:txBody>
-      </p:sp>
-      <p:sp>
-        <p:nvSpPr>
-          <p:cNvPr id="35" name="Isosceles Triangle 34">
-            <a:extLst>
-              <a:ext uri="{FF2B5EF4-FFF2-40B4-BE49-F238E27FC236}">
-                <a16:creationId xmlns:a16="http://schemas.microsoft.com/office/drawing/2014/main" id="{633C5E46-DAC5-4661-9C87-22B08E2A512F}"/>
-              </a:ext>
-              <a:ext uri="{C183D7F6-B498-43B3-948B-1728B52AA6E4}">
-                <adec:decorative xmlns:adec="http://schemas.microsoft.com/office/drawing/2017/decorative" val="1"/>
-              </a:ext>
-            </a:extLst>
-          </p:cNvPr>
-          <p:cNvSpPr>
-            <a:spLocks noGrp="1" noRot="1" noChangeAspect="1" noMove="1" noResize="1" noEditPoints="1" noAdjustHandles="1" noChangeArrowheads="1" noChangeShapeType="1" noTextEdit="1"/>
-          </p:cNvSpPr>
-          <p:nvPr>
-            <p:extLst>
-              <p:ext uri="{386F3935-93C4-4BCD-93E2-E3B085C9AB24}">
-                <p16:designElem xmlns:p16="http://schemas.microsoft.com/office/powerpoint/2015/main" val="1"/>
-              </p:ext>
-            </p:extLst>
-          </p:nvPr>
-        </p:nvSpPr>
-        <p:spPr>
-          <a:xfrm>
-            <a:off x="1343436" y="5721108"/>
-            <a:ext cx="2261965" cy="1136891"/>
-          </a:xfrm>
-          <a:prstGeom prst="triangle">
-            <a:avLst>
-              <a:gd name="adj" fmla="val 50000"/>
-            </a:avLst>
-          </a:prstGeom>
-          <a:solidFill>
-            <a:schemeClr val="accent4">
-              <a:alpha val="30000"/>
-            </a:schemeClr>
-          </a:solidFill>
-          <a:ln>
-            <a:noFill/>
-          </a:ln>
-        </p:spPr>
-        <p:style>
-          <a:lnRef idx="2">
-            <a:schemeClr val="accent1">
-              <a:shade val="50000"/>
-            </a:schemeClr>
-          </a:lnRef>
-          <a:fillRef idx="1">
-            <a:schemeClr val="accent1"/>
-          </a:fillRef>
-          <a:effectRef idx="0">
-            <a:schemeClr val="accent1"/>
-          </a:effectRef>
-          <a:fontRef idx="minor">
-            <a:schemeClr val="lt1"/>
-          </a:fontRef>
-        </p:style>
-        <p:txBody>
-          <a:bodyPr rtlCol="0" anchor="ctr"/>
-          <a:lstStyle/>
-          <a:p>
-            <a:pPr algn="ctr"/>
-            <a:endParaRPr lang="en-US"/>
-          </a:p>
-        </p:txBody>
-      </p:sp>
-      <p:sp>
-        <p:nvSpPr>
-          <p:cNvPr id="2" name="Овал 1"/>
           <p:cNvSpPr/>
           <p:nvPr/>
         </p:nvSpPr>
@@ -28033,7 +27676,13 @@
       </p:sp>
       <p:sp>
         <p:nvSpPr>
-          <p:cNvPr id="3" name="TextBox 2"/>
+          <p:cNvPr id="9" name="TextBox 8">
+            <a:extLst>
+              <a:ext uri="{FF2B5EF4-FFF2-40B4-BE49-F238E27FC236}">
+                <a16:creationId xmlns:a16="http://schemas.microsoft.com/office/drawing/2014/main" id="{FBA6D361-9852-437A-8836-A11FC1315E84}"/>
+              </a:ext>
+            </a:extLst>
+          </p:cNvPr>
           <p:cNvSpPr txBox="1"/>
           <p:nvPr/>
         </p:nvSpPr>
@@ -28063,7 +27712,13 @@
       </p:sp>
       <p:sp>
         <p:nvSpPr>
-          <p:cNvPr id="11" name="Овал 10"/>
+          <p:cNvPr id="10" name="Овал 10">
+            <a:extLst>
+              <a:ext uri="{FF2B5EF4-FFF2-40B4-BE49-F238E27FC236}">
+                <a16:creationId xmlns:a16="http://schemas.microsoft.com/office/drawing/2014/main" id="{D4F1F2A2-205F-4D3A-BB0E-D4C00386411C}"/>
+              </a:ext>
+            </a:extLst>
+          </p:cNvPr>
           <p:cNvSpPr/>
           <p:nvPr/>
         </p:nvSpPr>
@@ -28109,7 +27764,13 @@
       </p:sp>
       <p:sp>
         <p:nvSpPr>
-          <p:cNvPr id="12" name="Овал 11"/>
+          <p:cNvPr id="11" name="Овал 11">
+            <a:extLst>
+              <a:ext uri="{FF2B5EF4-FFF2-40B4-BE49-F238E27FC236}">
+                <a16:creationId xmlns:a16="http://schemas.microsoft.com/office/drawing/2014/main" id="{7420BBE4-5AC4-412C-A4EA-B57BF31364EB}"/>
+              </a:ext>
+            </a:extLst>
+          </p:cNvPr>
           <p:cNvSpPr/>
           <p:nvPr/>
         </p:nvSpPr>
@@ -28155,7 +27816,13 @@
       </p:sp>
       <p:sp>
         <p:nvSpPr>
-          <p:cNvPr id="40" name="Овал 39"/>
+          <p:cNvPr id="12" name="Овал 39">
+            <a:extLst>
+              <a:ext uri="{FF2B5EF4-FFF2-40B4-BE49-F238E27FC236}">
+                <a16:creationId xmlns:a16="http://schemas.microsoft.com/office/drawing/2014/main" id="{08986A69-85BF-4F48-A293-E25F64CA5DCE}"/>
+              </a:ext>
+            </a:extLst>
+          </p:cNvPr>
           <p:cNvSpPr/>
           <p:nvPr/>
         </p:nvSpPr>
@@ -28196,7 +27863,13 @@
       </p:sp>
       <p:sp>
         <p:nvSpPr>
-          <p:cNvPr id="13" name="Овал 12"/>
+          <p:cNvPr id="13" name="Овал 12">
+            <a:extLst>
+              <a:ext uri="{FF2B5EF4-FFF2-40B4-BE49-F238E27FC236}">
+                <a16:creationId xmlns:a16="http://schemas.microsoft.com/office/drawing/2014/main" id="{63C73847-6514-4302-A6CC-10A0873EDE15}"/>
+              </a:ext>
+            </a:extLst>
+          </p:cNvPr>
           <p:cNvSpPr/>
           <p:nvPr/>
         </p:nvSpPr>
@@ -28242,9 +27915,15 @@
       </p:sp>
       <p:cxnSp>
         <p:nvCxnSpPr>
-          <p:cNvPr id="17" name="Прямая со стрелкой 16"/>
+          <p:cNvPr id="14" name="Прямая со стрелкой 16">
+            <a:extLst>
+              <a:ext uri="{FF2B5EF4-FFF2-40B4-BE49-F238E27FC236}">
+                <a16:creationId xmlns:a16="http://schemas.microsoft.com/office/drawing/2014/main" id="{59ADE188-6648-4212-B321-CE17948479B7}"/>
+              </a:ext>
+            </a:extLst>
+          </p:cNvPr>
           <p:cNvCxnSpPr>
-            <a:stCxn id="11" idx="3"/>
+            <a:stCxn id="10" idx="3"/>
             <a:endCxn id="13" idx="7"/>
           </p:cNvCxnSpPr>
           <p:nvPr/>
@@ -28278,9 +27957,15 @@
       </p:cxnSp>
       <p:cxnSp>
         <p:nvCxnSpPr>
-          <p:cNvPr id="20" name="Прямая со стрелкой 19"/>
+          <p:cNvPr id="15" name="Прямая со стрелкой 19">
+            <a:extLst>
+              <a:ext uri="{FF2B5EF4-FFF2-40B4-BE49-F238E27FC236}">
+                <a16:creationId xmlns:a16="http://schemas.microsoft.com/office/drawing/2014/main" id="{AF075134-F5DE-442D-9AF0-B3742966ACE0}"/>
+              </a:ext>
+            </a:extLst>
+          </p:cNvPr>
           <p:cNvCxnSpPr>
-            <a:stCxn id="11" idx="5"/>
+            <a:stCxn id="10" idx="5"/>
           </p:cNvCxnSpPr>
           <p:nvPr/>
         </p:nvCxnSpPr>
@@ -28313,9 +27998,15 @@
       </p:cxnSp>
       <p:cxnSp>
         <p:nvCxnSpPr>
-          <p:cNvPr id="23" name="Прямая со стрелкой 22"/>
+          <p:cNvPr id="16" name="Прямая со стрелкой 22">
+            <a:extLst>
+              <a:ext uri="{FF2B5EF4-FFF2-40B4-BE49-F238E27FC236}">
+                <a16:creationId xmlns:a16="http://schemas.microsoft.com/office/drawing/2014/main" id="{0E0565AC-3B91-4ACD-8A97-A56189BF9C8B}"/>
+              </a:ext>
+            </a:extLst>
+          </p:cNvPr>
           <p:cNvCxnSpPr>
-            <a:stCxn id="2" idx="5"/>
+            <a:stCxn id="8" idx="5"/>
           </p:cNvCxnSpPr>
           <p:nvPr/>
         </p:nvCxnSpPr>
@@ -28348,7 +28039,13 @@
       </p:cxnSp>
       <p:sp>
         <p:nvSpPr>
-          <p:cNvPr id="34" name="Овал 33"/>
+          <p:cNvPr id="17" name="Овал 33">
+            <a:extLst>
+              <a:ext uri="{FF2B5EF4-FFF2-40B4-BE49-F238E27FC236}">
+                <a16:creationId xmlns:a16="http://schemas.microsoft.com/office/drawing/2014/main" id="{E2A8858F-5033-4EBE-9DA8-BBE3E405A97C}"/>
+              </a:ext>
+            </a:extLst>
+          </p:cNvPr>
           <p:cNvSpPr/>
           <p:nvPr/>
         </p:nvSpPr>
@@ -28386,9 +28083,15 @@
       </p:sp>
       <p:cxnSp>
         <p:nvCxnSpPr>
-          <p:cNvPr id="6" name="Прямая со стрелкой 5"/>
+          <p:cNvPr id="18" name="Прямая со стрелкой 5">
+            <a:extLst>
+              <a:ext uri="{FF2B5EF4-FFF2-40B4-BE49-F238E27FC236}">
+                <a16:creationId xmlns:a16="http://schemas.microsoft.com/office/drawing/2014/main" id="{F3B53BA7-688C-433A-8142-C87C268C9162}"/>
+              </a:ext>
+            </a:extLst>
+          </p:cNvPr>
           <p:cNvCxnSpPr>
-            <a:stCxn id="2" idx="3"/>
+            <a:stCxn id="8" idx="3"/>
           </p:cNvCxnSpPr>
           <p:nvPr/>
         </p:nvCxnSpPr>
@@ -28421,7 +28124,13 @@
       </p:cxnSp>
       <p:sp>
         <p:nvSpPr>
-          <p:cNvPr id="14" name="Овал 13"/>
+          <p:cNvPr id="19" name="Овал 13">
+            <a:extLst>
+              <a:ext uri="{FF2B5EF4-FFF2-40B4-BE49-F238E27FC236}">
+                <a16:creationId xmlns:a16="http://schemas.microsoft.com/office/drawing/2014/main" id="{7B2F34C1-F6D2-41CC-A978-89CF36F76A97}"/>
+              </a:ext>
+            </a:extLst>
+          </p:cNvPr>
           <p:cNvSpPr/>
           <p:nvPr/>
         </p:nvSpPr>
@@ -28467,7 +28176,13 @@
       </p:sp>
       <p:sp>
         <p:nvSpPr>
-          <p:cNvPr id="26" name="TextBox 25"/>
+          <p:cNvPr id="20" name="TextBox 19">
+            <a:extLst>
+              <a:ext uri="{FF2B5EF4-FFF2-40B4-BE49-F238E27FC236}">
+                <a16:creationId xmlns:a16="http://schemas.microsoft.com/office/drawing/2014/main" id="{DEBC309F-F7E7-437A-9291-1E0A28D671AA}"/>
+              </a:ext>
+            </a:extLst>
+          </p:cNvPr>
           <p:cNvSpPr txBox="1"/>
           <p:nvPr/>
         </p:nvSpPr>
@@ -28497,14 +28212,20 @@
       </p:sp>
       <p:sp>
         <p:nvSpPr>
-          <p:cNvPr id="27" name="TextBox 26"/>
+          <p:cNvPr id="21" name="TextBox 20">
+            <a:extLst>
+              <a:ext uri="{FF2B5EF4-FFF2-40B4-BE49-F238E27FC236}">
+                <a16:creationId xmlns:a16="http://schemas.microsoft.com/office/drawing/2014/main" id="{6B859FA3-915D-465B-8C33-410A431CF584}"/>
+              </a:ext>
+            </a:extLst>
+          </p:cNvPr>
           <p:cNvSpPr txBox="1"/>
           <p:nvPr/>
         </p:nvSpPr>
         <p:spPr>
           <a:xfrm>
-            <a:off x="9919576" y="5873579"/>
-            <a:ext cx="1728871" cy="461665"/>
+            <a:off x="9904137" y="5860738"/>
+            <a:ext cx="1546641" cy="461665"/>
           </a:xfrm>
           <a:prstGeom prst="rect">
             <a:avLst/>
@@ -28517,9 +28238,10 @@
           </a:bodyPr>
           <a:lstStyle/>
           <a:p>
+            <a:pPr algn="ctr"/>
             <a:r>
               <a:rPr lang="en-US" sz="2400" dirty="0"/>
-              <a:t>Value object</a:t>
+              <a:t>Immutable</a:t>
             </a:r>
             <a:endParaRPr lang="ru-RU" sz="2400" dirty="0"/>
           </a:p>
@@ -28527,7 +28249,13 @@
       </p:sp>
       <p:sp>
         <p:nvSpPr>
-          <p:cNvPr id="28" name="TextBox 27"/>
+          <p:cNvPr id="22" name="TextBox 21">
+            <a:extLst>
+              <a:ext uri="{FF2B5EF4-FFF2-40B4-BE49-F238E27FC236}">
+                <a16:creationId xmlns:a16="http://schemas.microsoft.com/office/drawing/2014/main" id="{828A49EB-583A-4866-BDD7-2054E8FE42AF}"/>
+              </a:ext>
+            </a:extLst>
+          </p:cNvPr>
           <p:cNvSpPr txBox="1"/>
           <p:nvPr/>
         </p:nvSpPr>
@@ -28557,7 +28285,13 @@
       </p:sp>
       <p:sp>
         <p:nvSpPr>
-          <p:cNvPr id="29" name="TextBox 28"/>
+          <p:cNvPr id="23" name="TextBox 22">
+            <a:extLst>
+              <a:ext uri="{FF2B5EF4-FFF2-40B4-BE49-F238E27FC236}">
+                <a16:creationId xmlns:a16="http://schemas.microsoft.com/office/drawing/2014/main" id="{D67689E5-5104-4138-B248-9D76DDE75126}"/>
+              </a:ext>
+            </a:extLst>
+          </p:cNvPr>
           <p:cNvSpPr txBox="1"/>
           <p:nvPr/>
         </p:nvSpPr>
@@ -28587,7 +28321,13 @@
       </p:sp>
       <p:sp>
         <p:nvSpPr>
-          <p:cNvPr id="41" name="TextBox 40"/>
+          <p:cNvPr id="24" name="TextBox 23">
+            <a:extLst>
+              <a:ext uri="{FF2B5EF4-FFF2-40B4-BE49-F238E27FC236}">
+                <a16:creationId xmlns:a16="http://schemas.microsoft.com/office/drawing/2014/main" id="{AF5118CF-69C7-493E-BD53-63CA8266F846}"/>
+              </a:ext>
+            </a:extLst>
+          </p:cNvPr>
           <p:cNvSpPr txBox="1"/>
           <p:nvPr/>
         </p:nvSpPr>
@@ -28623,9 +28363,15 @@
       </p:sp>
       <p:cxnSp>
         <p:nvCxnSpPr>
-          <p:cNvPr id="43" name="Прямая соединительная линия 42"/>
+          <p:cNvPr id="25" name="Прямая соединительная линия 42">
+            <a:extLst>
+              <a:ext uri="{FF2B5EF4-FFF2-40B4-BE49-F238E27FC236}">
+                <a16:creationId xmlns:a16="http://schemas.microsoft.com/office/drawing/2014/main" id="{6A6294B7-B8BE-40A8-A85E-70FF9C13CA44}"/>
+              </a:ext>
+            </a:extLst>
+          </p:cNvPr>
           <p:cNvCxnSpPr>
-            <a:stCxn id="41" idx="0"/>
+            <a:stCxn id="24" idx="0"/>
           </p:cNvCxnSpPr>
           <p:nvPr/>
         </p:nvCxnSpPr>
@@ -28661,7 +28407,13 @@
       </p:cxnSp>
       <p:sp>
         <p:nvSpPr>
-          <p:cNvPr id="44" name="TextBox 43"/>
+          <p:cNvPr id="26" name="TextBox 25">
+            <a:extLst>
+              <a:ext uri="{FF2B5EF4-FFF2-40B4-BE49-F238E27FC236}">
+                <a16:creationId xmlns:a16="http://schemas.microsoft.com/office/drawing/2014/main" id="{C22D1F33-FA8C-4ABA-9475-2660F63D2B77}"/>
+              </a:ext>
+            </a:extLst>
+          </p:cNvPr>
           <p:cNvSpPr txBox="1"/>
           <p:nvPr/>
         </p:nvSpPr>
@@ -28689,7 +28441,7 @@
           <a:p>
             <a:r>
               <a:rPr lang="en-US" sz="2400" dirty="0"/>
-              <a:t>Classical school</a:t>
+              <a:t>Detroit school</a:t>
             </a:r>
             <a:endParaRPr lang="ru-RU" sz="2400" dirty="0"/>
           </a:p>
@@ -28697,11 +28449,17 @@
       </p:sp>
       <p:cxnSp>
         <p:nvCxnSpPr>
-          <p:cNvPr id="45" name="Прямая соединительная линия 44"/>
+          <p:cNvPr id="27" name="Прямая соединительная линия 44">
+            <a:extLst>
+              <a:ext uri="{FF2B5EF4-FFF2-40B4-BE49-F238E27FC236}">
+                <a16:creationId xmlns:a16="http://schemas.microsoft.com/office/drawing/2014/main" id="{2E2ACB2D-3453-4758-99DC-71653229DE59}"/>
+              </a:ext>
+            </a:extLst>
+          </p:cNvPr>
           <p:cNvCxnSpPr>
             <a:cxnSpLocks/>
-            <a:stCxn id="44" idx="3"/>
-            <a:endCxn id="34" idx="1"/>
+            <a:stCxn id="26" idx="3"/>
+            <a:endCxn id="17" idx="1"/>
           </p:cNvCxnSpPr>
           <p:nvPr/>
         </p:nvCxnSpPr>
@@ -28736,10 +28494,10 @@
       </p:cxnSp>
       <p:sp>
         <p:nvSpPr>
-          <p:cNvPr id="51" name="Title 1">
+          <p:cNvPr id="28" name="Title 1">
             <a:extLst>
               <a:ext uri="{FF2B5EF4-FFF2-40B4-BE49-F238E27FC236}">
-                <a16:creationId xmlns:a16="http://schemas.microsoft.com/office/drawing/2014/main" id="{BEE821A7-353A-4F91-A01B-A7A2DE182022}"/>
+                <a16:creationId xmlns:a16="http://schemas.microsoft.com/office/drawing/2014/main" id="{8989741F-21ED-4FA8-8D77-1305911746F7}"/>
               </a:ext>
             </a:extLst>
           </p:cNvPr>
@@ -28772,7 +28530,7 @@
     </p:spTree>
     <p:extLst>
       <p:ext uri="{BB962C8B-B14F-4D97-AF65-F5344CB8AC3E}">
-        <p14:creationId xmlns:p14="http://schemas.microsoft.com/office/powerpoint/2010/main" val="3786339213"/>
+        <p14:creationId xmlns:p14="http://schemas.microsoft.com/office/powerpoint/2010/main" val="1314214566"/>
       </p:ext>
     </p:extLst>
   </p:cSld>
@@ -28822,7 +28580,7 @@
           <a:p>
             <a:r>
               <a:rPr lang="en-US" dirty="0"/>
-              <a:t>Classical vs London</a:t>
+              <a:t>Detroit vs London</a:t>
             </a:r>
           </a:p>
         </p:txBody>
@@ -28909,7 +28667,7 @@
           <a:p>
             <a:r>
               <a:rPr lang="en-US" sz="2400" dirty="0"/>
-              <a:t>Classical school is good in its treatment of intra-system communications</a:t>
+              <a:t>Detroit school is good in its treatment of intra-system communications</a:t>
             </a:r>
           </a:p>
           <a:p>
@@ -28935,7 +28693,7 @@
     </p:spTree>
     <p:extLst>
       <p:ext uri="{BB962C8B-B14F-4D97-AF65-F5344CB8AC3E}">
-        <p14:creationId xmlns:p14="http://schemas.microsoft.com/office/powerpoint/2010/main" val="1314214566"/>
+        <p14:creationId xmlns:p14="http://schemas.microsoft.com/office/powerpoint/2010/main" val="3832442241"/>
       </p:ext>
     </p:extLst>
   </p:cSld>
@@ -40302,7 +40060,7 @@
           <a:p>
             <a:r>
               <a:rPr lang="en-US" sz="2400" dirty="0"/>
-              <a:t>Better protection from regression and resistance from refactoring</a:t>
+              <a:t>Better protection against bugs and resistance to refactoring</a:t>
             </a:r>
           </a:p>
           <a:p>
@@ -43282,7 +43040,7 @@
             </a:r>
             <a:r>
               <a:rPr lang="en-US" sz="2400" dirty="0"/>
-              <a:t> in integration tests – implementation details must be verified and not be mocked (protection from regression)</a:t>
+              <a:t> in integration tests – implementation details must be verified and not be mocked (protection against bugs)</a:t>
             </a:r>
           </a:p>
           <a:p>
@@ -44205,7 +43963,7 @@
         <p:spPr>
           <a:xfrm>
             <a:off x="7700873" y="5501943"/>
-            <a:ext cx="4719006" cy="1200329"/>
+            <a:ext cx="4275779" cy="1200329"/>
           </a:xfrm>
           <a:prstGeom prst="rect">
             <a:avLst/>
@@ -44235,7 +43993,7 @@
             </a:br>
             <a:r>
               <a:rPr lang="en-US" sz="2400" dirty="0"/>
-              <a:t>protection against regressions and </a:t>
+              <a:t>protection against bugs and </a:t>
             </a:r>
             <a:br>
               <a:rPr lang="en-US" sz="2400" dirty="0"/>
@@ -45804,7 +45562,7 @@
           <a:p>
             <a:r>
               <a:rPr lang="en-US" sz="2400" dirty="0"/>
-              <a:t>Classical vs London – which school does solve </a:t>
+              <a:t>Detroit vs London – which school does solve </a:t>
             </a:r>
             <a:r>
               <a:rPr lang="en-US" sz="2400" i="1" dirty="0"/>
@@ -45992,7 +45750,7 @@
           <a:p>
             <a:r>
               <a:rPr lang="en-US" dirty="0"/>
-              <a:t>Logic in private methods/private state</a:t>
+              <a:t>Logic in private methods / private state</a:t>
             </a:r>
           </a:p>
         </p:txBody>
@@ -46513,6 +46271,12 @@
               <a:t>Inject service at the beginning of business operation (in controllers)</a:t>
             </a:r>
           </a:p>
+          <a:p>
+            <a:r>
+              <a:rPr lang="en-US" sz="2400" dirty="0"/>
+              <a:t>Some logic can consider number of days in month (28-31) and must be covered</a:t>
+            </a:r>
+          </a:p>
         </p:txBody>
       </p:sp>
     </p:spTree>
@@ -46784,6 +46548,16 @@
             <a:r>
               <a:rPr lang="en-US" sz="2400" dirty="0"/>
               <a:t>)</a:t>
+            </a:r>
+          </a:p>
+          <a:p>
+            <a:r>
+              <a:rPr lang="en-US" sz="2400"/>
+              <a:t>Name tests clearly</a:t>
+            </a:r>
+            <a:r>
+              <a:rPr lang="en-US" sz="2400" dirty="0"/>
+              <a:t>, don’t be afraid of long names</a:t>
             </a:r>
             <a:endParaRPr lang="ru-RU" sz="2400" dirty="0"/>
           </a:p>
@@ -51192,7 +50966,7 @@
           <a:p>
             <a:r>
               <a:rPr lang="en-US" sz="2400" dirty="0"/>
-              <a:t>High-quality unit test (in terms of cost / benefit)</a:t>
+              <a:t>High-quality unit test (in terms of cost/benefit)</a:t>
             </a:r>
           </a:p>
           <a:p>
@@ -51305,7 +51079,7 @@
           <a:p>
             <a:r>
               <a:rPr lang="en-US" sz="2400" dirty="0"/>
-              <a:t>Preferrable in classic school</a:t>
+              <a:t>Preferrable in the Detroit school</a:t>
             </a:r>
           </a:p>
         </p:txBody>
@@ -51488,7 +51262,7 @@
           <a:p>
             <a:r>
               <a:rPr lang="en-US" sz="2400" dirty="0"/>
-              <a:t>Classical: </a:t>
+              <a:t>Detroit: </a:t>
             </a:r>
             <a:r>
               <a:rPr lang="en-US" sz="2400" b="0" dirty="0">
@@ -51608,7 +51382,7 @@
                   <a:srgbClr val="292929"/>
                 </a:solidFill>
               </a:rPr>
-              <a:t>Classical &amp; London styles separates SUT from collaborators in the same way (only out-of-process/shared OR all collaborators)</a:t>
+              <a:t>Detroit &amp; London styles separates SUT from collaborators in the same way (only out-of-process/shared OR all collaborators)</a:t>
             </a:r>
             <a:endParaRPr lang="ru-RU" sz="2400" dirty="0"/>
           </a:p>

</xml_diff>